<commit_message>
Update labs and tasks
</commit_message>
<xml_diff>
--- a/slides/Session 03 - Introducing Python/Session 03 - Introducing Python.pptx
+++ b/slides/Session 03 - Introducing Python/Session 03 - Introducing Python.pptx
@@ -311,7 +311,7 @@
           <a:p>
             <a:fld id="{A241AC98-512A-4A35-865E-757B6C1F07A2}" type="datetimeFigureOut">
               <a:rPr lang="en-US" smtClean="0"/>
-              <a:t>2/7/2023</a:t>
+              <a:t>5/23/2023</a:t>
             </a:fld>
             <a:endParaRPr lang="en-US"/>
           </a:p>
@@ -477,7 +477,7 @@
           <a:p>
             <a:fld id="{3854CEE7-15DE-41D9-8CA2-D1E137B1D850}" type="datetimeFigureOut">
               <a:rPr lang="en-US" smtClean="0"/>
-              <a:t>2/7/2023</a:t>
+              <a:t>5/23/2023</a:t>
             </a:fld>
             <a:endParaRPr lang="en-US"/>
           </a:p>
@@ -1548,7 +1548,7 @@
           <a:p>
             <a:fld id="{5555EB2C-244D-4423-AD97-018ED6478B87}" type="datetime1">
               <a:rPr lang="en-US" smtClean="0"/>
-              <a:t>2/7/2023</a:t>
+              <a:t>5/23/2023</a:t>
             </a:fld>
             <a:endParaRPr lang="en-US"/>
           </a:p>
@@ -1727,7 +1727,7 @@
           <a:p>
             <a:fld id="{A2B41D1F-7576-4C60-B4EB-5115BC56CF40}" type="datetime1">
               <a:rPr lang="en-US" smtClean="0"/>
-              <a:t>2/7/2023</a:t>
+              <a:t>5/23/2023</a:t>
             </a:fld>
             <a:endParaRPr lang="en-US"/>
           </a:p>
@@ -1919,7 +1919,7 @@
           <a:p>
             <a:fld id="{E79D1398-4D56-44F9-BA35-34ACF3159A64}" type="datetime1">
               <a:rPr lang="en-US" smtClean="0"/>
-              <a:t>2/7/2023</a:t>
+              <a:t>5/23/2023</a:t>
             </a:fld>
             <a:endParaRPr lang="en-US"/>
           </a:p>
@@ -2101,7 +2101,7 @@
           <a:p>
             <a:fld id="{A3CF632E-48CB-4EEB-A6B6-DEC7AD7CC976}" type="datetime1">
               <a:rPr lang="en-US" smtClean="0"/>
-              <a:t>2/7/2023</a:t>
+              <a:t>5/23/2023</a:t>
             </a:fld>
             <a:endParaRPr lang="en-US"/>
           </a:p>
@@ -2354,7 +2354,7 @@
           <a:p>
             <a:fld id="{BAEEE52C-3A57-458E-95F6-96B2FA9D1DD4}" type="datetime1">
               <a:rPr lang="en-US" smtClean="0"/>
-              <a:t>2/7/2023</a:t>
+              <a:t>5/23/2023</a:t>
             </a:fld>
             <a:endParaRPr lang="en-US"/>
           </a:p>
@@ -2598,7 +2598,7 @@
           <a:p>
             <a:fld id="{766FC747-A48A-4FF2-8EE4-3E95ECD1C2A8}" type="datetime1">
               <a:rPr lang="en-US" smtClean="0"/>
-              <a:t>2/7/2023</a:t>
+              <a:t>5/23/2023</a:t>
             </a:fld>
             <a:endParaRPr lang="en-US"/>
           </a:p>
@@ -2977,7 +2977,7 @@
           <a:p>
             <a:fld id="{C9BF5758-AB7F-463D-B638-E1729B95E126}" type="datetime1">
               <a:rPr lang="en-US" smtClean="0"/>
-              <a:t>2/7/2023</a:t>
+              <a:t>5/23/2023</a:t>
             </a:fld>
             <a:endParaRPr lang="en-US"/>
           </a:p>
@@ -3107,7 +3107,7 @@
           <a:p>
             <a:fld id="{F3718C77-7DD0-4738-BF52-D0EC9F78A76E}" type="datetime1">
               <a:rPr lang="en-US" smtClean="0"/>
-              <a:t>2/7/2023</a:t>
+              <a:t>5/23/2023</a:t>
             </a:fld>
             <a:endParaRPr lang="en-US"/>
           </a:p>
@@ -3214,7 +3214,7 @@
           <a:p>
             <a:fld id="{948970CF-13D9-4E1D-A74F-2CFE4953FCDB}" type="datetime1">
               <a:rPr lang="en-US" smtClean="0"/>
-              <a:t>2/7/2023</a:t>
+              <a:t>5/23/2023</a:t>
             </a:fld>
             <a:endParaRPr lang="en-US"/>
           </a:p>
@@ -3503,7 +3503,7 @@
           <a:p>
             <a:fld id="{F68C49B9-4E1C-4967-B9CF-0BF9FECBE837}" type="datetime1">
               <a:rPr lang="en-US" smtClean="0"/>
-              <a:t>2/7/2023</a:t>
+              <a:t>5/23/2023</a:t>
             </a:fld>
             <a:endParaRPr lang="en-US"/>
           </a:p>
@@ -3771,7 +3771,7 @@
           <a:p>
             <a:fld id="{7E338CBB-1F06-4333-9BBF-66628B15E581}" type="datetime1">
               <a:rPr lang="en-US" smtClean="0"/>
-              <a:t>2/7/2023</a:t>
+              <a:t>5/23/2023</a:t>
             </a:fld>
             <a:endParaRPr lang="en-US"/>
           </a:p>
@@ -3996,7 +3996,7 @@
           <a:p>
             <a:fld id="{705EC883-F03C-4CA3-AF62-BEF30EEA4F65}" type="datetime1">
               <a:rPr lang="en-US" smtClean="0"/>
-              <a:t>2/7/2023</a:t>
+              <a:t>5/23/2023</a:t>
             </a:fld>
             <a:endParaRPr lang="en-US"/>
           </a:p>
@@ -43035,7 +43035,7 @@
             </a:pPr>
             <a:r>
               <a:rPr lang="en-US" sz="2400" dirty="0"/>
-              <a:t>Email your working Python program to your TA</a:t>
+              <a:t>Upload your solution to the BNL QIS101 SharePoint site</a:t>
             </a:r>
           </a:p>
         </p:txBody>
@@ -43063,6 +43063,36 @@
           </a:p>
         </p:txBody>
       </p:sp>
+      <p:pic>
+        <p:nvPicPr>
+          <p:cNvPr id="6" name="Picture 5">
+            <a:extLst>
+              <a:ext uri="{FF2B5EF4-FFF2-40B4-BE49-F238E27FC236}">
+                <a16:creationId xmlns:a16="http://schemas.microsoft.com/office/drawing/2014/main" id="{9129D7F6-553C-56FA-4A4D-4331983812EB}"/>
+              </a:ext>
+            </a:extLst>
+          </p:cNvPr>
+          <p:cNvPicPr>
+            <a:picLocks noChangeAspect="1"/>
+          </p:cNvPicPr>
+          <p:nvPr/>
+        </p:nvPicPr>
+        <p:blipFill>
+          <a:blip r:embed="rId2"/>
+          <a:stretch>
+            <a:fillRect/>
+          </a:stretch>
+        </p:blipFill>
+        <p:spPr>
+          <a:xfrm>
+            <a:off x="696370" y="3706869"/>
+            <a:ext cx="7751261" cy="2702466"/>
+          </a:xfrm>
+          <a:prstGeom prst="rect">
+            <a:avLst/>
+          </a:prstGeom>
+        </p:spPr>
+      </p:pic>
     </p:spTree>
     <p:extLst>
       <p:ext uri="{BB962C8B-B14F-4D97-AF65-F5344CB8AC3E}">
@@ -43073,85 +43103,6 @@
   <p:clrMapOvr>
     <a:masterClrMapping/>
   </p:clrMapOvr>
-  <p:timing>
-    <p:tnLst>
-      <p:par>
-        <p:cTn id="1" dur="indefinite" restart="never" nodeType="tmRoot">
-          <p:childTnLst>
-            <p:seq concurrent="1" nextAc="seek">
-              <p:cTn id="2" dur="indefinite" nodeType="mainSeq">
-                <p:childTnLst>
-                  <p:par>
-                    <p:cTn id="3" fill="hold">
-                      <p:stCondLst>
-                        <p:cond delay="indefinite"/>
-                      </p:stCondLst>
-                      <p:childTnLst>
-                        <p:par>
-                          <p:cTn id="4" fill="hold">
-                            <p:stCondLst>
-                              <p:cond delay="0"/>
-                            </p:stCondLst>
-                            <p:childTnLst>
-                              <p:par>
-                                <p:cTn id="5" presetID="1" presetClass="entr" presetSubtype="0" fill="hold" nodeType="clickEffect">
-                                  <p:stCondLst>
-                                    <p:cond delay="0"/>
-                                  </p:stCondLst>
-                                  <p:childTnLst>
-                                    <p:set>
-                                      <p:cBhvr>
-                                        <p:cTn id="6" dur="1" fill="hold">
-                                          <p:stCondLst>
-                                            <p:cond delay="0"/>
-                                          </p:stCondLst>
-                                        </p:cTn>
-                                        <p:tgtEl>
-                                          <p:spTgt spid="3">
-                                            <p:txEl>
-                                              <p:pRg st="1" end="1"/>
-                                            </p:txEl>
-                                          </p:spTgt>
-                                        </p:tgtEl>
-                                        <p:attrNameLst>
-                                          <p:attrName>style.visibility</p:attrName>
-                                        </p:attrNameLst>
-                                      </p:cBhvr>
-                                      <p:to>
-                                        <p:strVal val="visible"/>
-                                      </p:to>
-                                    </p:set>
-                                  </p:childTnLst>
-                                </p:cTn>
-                              </p:par>
-                            </p:childTnLst>
-                          </p:cTn>
-                        </p:par>
-                      </p:childTnLst>
-                    </p:cTn>
-                  </p:par>
-                </p:childTnLst>
-              </p:cTn>
-              <p:prevCondLst>
-                <p:cond evt="onPrev" delay="0">
-                  <p:tgtEl>
-                    <p:sldTgt/>
-                  </p:tgtEl>
-                </p:cond>
-              </p:prevCondLst>
-              <p:nextCondLst>
-                <p:cond evt="onNext" delay="0">
-                  <p:tgtEl>
-                    <p:sldTgt/>
-                  </p:tgtEl>
-                </p:cond>
-              </p:nextCondLst>
-            </p:seq>
-          </p:childTnLst>
-        </p:cTn>
-      </p:par>
-    </p:tnLst>
-  </p:timing>
 </p:sld>
 </file>
 

</xml_diff>